<commit_message>
Update doc for use
</commit_message>
<xml_diff>
--- a/DebugTools使い方.pptx
+++ b/DebugTools使い方.pptx
@@ -8,18 +8,17 @@
   <p:sldIdLst>
     <p:sldId id="256" r:id="rId3"/>
     <p:sldId id="258" r:id="rId4"/>
-    <p:sldId id="259" r:id="rId5"/>
-    <p:sldId id="260" r:id="rId6"/>
-    <p:sldId id="263" r:id="rId7"/>
-    <p:sldId id="261" r:id="rId8"/>
-    <p:sldId id="262" r:id="rId9"/>
-    <p:sldId id="264" r:id="rId10"/>
-    <p:sldId id="266" r:id="rId11"/>
-    <p:sldId id="267" r:id="rId12"/>
-    <p:sldId id="268" r:id="rId13"/>
-    <p:sldId id="269" r:id="rId14"/>
-    <p:sldId id="270" r:id="rId15"/>
-    <p:sldId id="271" r:id="rId16"/>
+    <p:sldId id="260" r:id="rId5"/>
+    <p:sldId id="263" r:id="rId6"/>
+    <p:sldId id="261" r:id="rId7"/>
+    <p:sldId id="262" r:id="rId8"/>
+    <p:sldId id="264" r:id="rId9"/>
+    <p:sldId id="266" r:id="rId10"/>
+    <p:sldId id="267" r:id="rId11"/>
+    <p:sldId id="268" r:id="rId12"/>
+    <p:sldId id="269" r:id="rId13"/>
+    <p:sldId id="270" r:id="rId14"/>
+    <p:sldId id="271" r:id="rId15"/>
   </p:sldIdLst>
   <p:sldSz cx="12192000" cy="6858000"/>
   <p:notesSz cx="6858000" cy="9144000"/>
@@ -118,6 +117,11 @@
       </a:defRPr>
     </a:lvl9pPr>
   </p:defaultTextStyle>
+  <p:extLst>
+    <p:ext uri="{EFAFB233-063F-42B5-8137-9DF3F51BA10A}">
+      <p15:sldGuideLst xmlns:p15="http://schemas.microsoft.com/office/powerpoint/2012/main"/>
+    </p:ext>
+  </p:extLst>
 </p:presentation>
 </file>
 
@@ -4630,168 +4634,6 @@
               <a:buChar char="u"/>
             </a:pPr>
             <a:r>
-              <a:rPr lang="en-US" altLang="ja-JP" sz="3600" dirty="0" err="1"/>
-              <a:t>OutputDebugStringEx</a:t>
-            </a:r>
-            <a:r>
-              <a:rPr kumimoji="1" lang="en-US" altLang="ja-JP" sz="3600" dirty="0"/>
-              <a:t>(str, …)</a:t>
-            </a:r>
-            <a:endParaRPr kumimoji="1" lang="ja-JP" altLang="en-US" sz="3600" dirty="0"/>
-          </a:p>
-        </p:txBody>
-      </p:sp>
-      <p:sp>
-        <p:nvSpPr>
-          <p:cNvPr id="3" name="コンテンツ プレースホルダー 2">
-            <a:extLst>
-              <a:ext uri="{FF2B5EF4-FFF2-40B4-BE49-F238E27FC236}">
-                <a16:creationId xmlns:a16="http://schemas.microsoft.com/office/drawing/2014/main" id="{D2559C2F-FBCB-4B0B-B37E-C4A7260BD447}"/>
-              </a:ext>
-            </a:extLst>
-          </p:cNvPr>
-          <p:cNvSpPr>
-            <a:spLocks noGrp="1"/>
-          </p:cNvSpPr>
-          <p:nvPr>
-            <p:ph idx="1"/>
-          </p:nvPr>
-        </p:nvSpPr>
-        <p:spPr/>
-        <p:txBody>
-          <a:bodyPr/>
-          <a:lstStyle/>
-          <a:p>
-            <a:pPr marL="0" indent="0">
-              <a:lnSpc>
-                <a:spcPct val="150000"/>
-              </a:lnSpc>
-              <a:buNone/>
-            </a:pPr>
-            <a:r>
-              <a:rPr lang="en-US" altLang="ja-JP" b="1" i="1" dirty="0"/>
-              <a:t>str</a:t>
-            </a:r>
-            <a:r>
-              <a:rPr lang="en-US" altLang="ja-JP" dirty="0"/>
-              <a:t>	</a:t>
-            </a:r>
-            <a:r>
-              <a:rPr lang="ja-JP" altLang="en-US" dirty="0"/>
-              <a:t>：表示させたい可変長引数文字列</a:t>
-            </a:r>
-            <a:endParaRPr lang="en-US" altLang="ja-JP" dirty="0"/>
-          </a:p>
-          <a:p>
-            <a:pPr marL="0" indent="0">
-              <a:lnSpc>
-                <a:spcPct val="150000"/>
-              </a:lnSpc>
-              <a:buNone/>
-            </a:pPr>
-            <a:r>
-              <a:rPr kumimoji="1" lang="en-US" altLang="ja-JP" b="1" i="1" dirty="0"/>
-              <a:t>…</a:t>
-            </a:r>
-            <a:r>
-              <a:rPr kumimoji="1" lang="en-US" altLang="ja-JP" dirty="0"/>
-              <a:t>	</a:t>
-            </a:r>
-            <a:r>
-              <a:rPr kumimoji="1" lang="ja-JP" altLang="en-US" dirty="0"/>
-              <a:t>：（文字列に取り入れたい）可変長引数</a:t>
-            </a:r>
-            <a:endParaRPr kumimoji="1" lang="en-US" altLang="ja-JP" dirty="0"/>
-          </a:p>
-          <a:p>
-            <a:pPr marL="0" indent="0">
-              <a:lnSpc>
-                <a:spcPct val="150000"/>
-              </a:lnSpc>
-              <a:buNone/>
-            </a:pPr>
-            <a:r>
-              <a:rPr lang="ja-JP" altLang="en-US" b="1" i="1" dirty="0"/>
-              <a:t>動作</a:t>
-            </a:r>
-            <a:r>
-              <a:rPr lang="en-US" altLang="ja-JP" b="1" i="1" dirty="0"/>
-              <a:t>	</a:t>
-            </a:r>
-            <a:r>
-              <a:rPr lang="ja-JP" altLang="en-US" dirty="0"/>
-              <a:t>：</a:t>
-            </a:r>
-            <a:r>
-              <a:rPr lang="en-US" altLang="ja-JP" b="1" i="1" dirty="0"/>
-              <a:t>str</a:t>
-            </a:r>
-            <a:r>
-              <a:rPr lang="ja-JP" altLang="en-US" dirty="0"/>
-              <a:t>をデバッグウィンドウに表示させる。</a:t>
-            </a:r>
-            <a:endParaRPr kumimoji="1" lang="en-US" altLang="ja-JP" b="1" i="1" dirty="0"/>
-          </a:p>
-        </p:txBody>
-      </p:sp>
-    </p:spTree>
-    <p:extLst>
-      <p:ext uri="{BB962C8B-B14F-4D97-AF65-F5344CB8AC3E}">
-        <p14:creationId xmlns:p14="http://schemas.microsoft.com/office/powerpoint/2010/main" val="3319339585"/>
-      </p:ext>
-    </p:extLst>
-  </p:cSld>
-  <p:clrMapOvr>
-    <a:masterClrMapping/>
-  </p:clrMapOvr>
-</p:sld>
-</file>
-
-<file path=ppt/slides/slide11.xml><?xml version="1.0" encoding="utf-8"?>
-<p:sld xmlns:a="http://schemas.openxmlformats.org/drawingml/2006/main" xmlns:r="http://schemas.openxmlformats.org/officeDocument/2006/relationships" xmlns:p="http://schemas.openxmlformats.org/presentationml/2006/main">
-  <p:cSld>
-    <p:spTree>
-      <p:nvGrpSpPr>
-        <p:cNvPr id="1" name=""/>
-        <p:cNvGrpSpPr/>
-        <p:nvPr/>
-      </p:nvGrpSpPr>
-      <p:grpSpPr>
-        <a:xfrm>
-          <a:off x="0" y="0"/>
-          <a:ext cx="0" cy="0"/>
-          <a:chOff x="0" y="0"/>
-          <a:chExt cx="0" cy="0"/>
-        </a:xfrm>
-      </p:grpSpPr>
-      <p:sp>
-        <p:nvSpPr>
-          <p:cNvPr id="2" name="タイトル 1">
-            <a:extLst>
-              <a:ext uri="{FF2B5EF4-FFF2-40B4-BE49-F238E27FC236}">
-                <a16:creationId xmlns:a16="http://schemas.microsoft.com/office/drawing/2014/main" id="{6F3C7249-01DA-4974-9471-773ADFF2918D}"/>
-              </a:ext>
-            </a:extLst>
-          </p:cNvPr>
-          <p:cNvSpPr>
-            <a:spLocks noGrp="1"/>
-          </p:cNvSpPr>
-          <p:nvPr>
-            <p:ph type="title"/>
-          </p:nvPr>
-        </p:nvSpPr>
-        <p:spPr/>
-        <p:txBody>
-          <a:bodyPr>
-            <a:normAutofit/>
-          </a:bodyPr>
-          <a:lstStyle/>
-          <a:p>
-            <a:pPr marL="571500" indent="-571500">
-              <a:buFont typeface="Wingdings" panose="05000000000000000000" pitchFamily="2" charset="2"/>
-              <a:buChar char="u"/>
-            </a:pPr>
-            <a:r>
               <a:rPr lang="en-US" altLang="ja-JP" sz="3600" dirty="0"/>
               <a:t>_T(str), TEXT(str)</a:t>
             </a:r>
@@ -5042,7 +4884,7 @@
 </p:sld>
 </file>
 
-<file path=ppt/slides/slide12.xml><?xml version="1.0" encoding="utf-8"?>
+<file path=ppt/slides/slide11.xml><?xml version="1.0" encoding="utf-8"?>
 <p:sld xmlns:a="http://schemas.openxmlformats.org/drawingml/2006/main" xmlns:r="http://schemas.openxmlformats.org/officeDocument/2006/relationships" xmlns:p="http://schemas.openxmlformats.org/presentationml/2006/main">
   <p:cSld>
     <p:spTree>
@@ -5258,7 +5100,7 @@
 </p:sld>
 </file>
 
-<file path=ppt/slides/slide13.xml><?xml version="1.0" encoding="utf-8"?>
+<file path=ppt/slides/slide12.xml><?xml version="1.0" encoding="utf-8"?>
 <p:sld xmlns:a="http://schemas.openxmlformats.org/drawingml/2006/main" xmlns:r="http://schemas.openxmlformats.org/officeDocument/2006/relationships" xmlns:p="http://schemas.openxmlformats.org/presentationml/2006/main">
   <p:cSld>
     <p:spTree>
@@ -5615,7 +5457,7 @@
 </p:sld>
 </file>
 
-<file path=ppt/slides/slide14.xml><?xml version="1.0" encoding="utf-8"?>
+<file path=ppt/slides/slide13.xml><?xml version="1.0" encoding="utf-8"?>
 <p:sld xmlns:a="http://schemas.openxmlformats.org/drawingml/2006/main" xmlns:r="http://schemas.openxmlformats.org/officeDocument/2006/relationships" xmlns:p="http://schemas.openxmlformats.org/presentationml/2006/main">
   <p:cSld>
     <p:spTree>
@@ -6598,32 +6440,14 @@
               <a:buChar char="u"/>
             </a:pPr>
             <a:r>
-              <a:rPr lang="en-US" altLang="ja-JP" dirty="0">
-                <a:solidFill>
-                  <a:schemeClr val="bg2">
-                    <a:lumMod val="90000"/>
-                  </a:schemeClr>
-                </a:solidFill>
-              </a:rPr>
+              <a:rPr lang="en-US" altLang="ja-JP" b="1" dirty="0"/>
               <a:t>Step1</a:t>
             </a:r>
             <a:r>
-              <a:rPr lang="ja-JP" altLang="en-US" dirty="0">
-                <a:solidFill>
-                  <a:schemeClr val="bg2">
-                    <a:lumMod val="90000"/>
-                  </a:schemeClr>
-                </a:solidFill>
-              </a:rPr>
+              <a:rPr lang="ja-JP" altLang="en-US" b="1" dirty="0"/>
               <a:t>　下準備</a:t>
             </a:r>
-            <a:endParaRPr lang="en-US" altLang="ja-JP" dirty="0">
-              <a:solidFill>
-                <a:schemeClr val="bg2">
-                  <a:lumMod val="90000"/>
-                </a:schemeClr>
-              </a:solidFill>
-            </a:endParaRPr>
+            <a:endParaRPr lang="en-US" altLang="ja-JP" b="1" dirty="0"/>
           </a:p>
           <a:p>
             <a:pPr marL="457200" indent="-457200">
@@ -6742,7 +6566,7 @@
     </p:spTree>
     <p:extLst>
       <p:ext uri="{BB962C8B-B14F-4D97-AF65-F5344CB8AC3E}">
-        <p14:creationId xmlns:p14="http://schemas.microsoft.com/office/powerpoint/2010/main" val="3806505"/>
+        <p14:creationId xmlns:p14="http://schemas.microsoft.com/office/powerpoint/2010/main" val="531861700"/>
       </p:ext>
     </p:extLst>
   </p:cSld>
@@ -6774,213 +6598,6 @@
           <p:cNvPr id="2" name="タイトル 1">
             <a:extLst>
               <a:ext uri="{FF2B5EF4-FFF2-40B4-BE49-F238E27FC236}">
-                <a16:creationId xmlns:a16="http://schemas.microsoft.com/office/drawing/2014/main" id="{B2C86995-7C10-4890-88A5-51F95162B848}"/>
-              </a:ext>
-            </a:extLst>
-          </p:cNvPr>
-          <p:cNvSpPr>
-            <a:spLocks noGrp="1"/>
-          </p:cNvSpPr>
-          <p:nvPr>
-            <p:ph type="title"/>
-          </p:nvPr>
-        </p:nvSpPr>
-        <p:spPr/>
-        <p:txBody>
-          <a:bodyPr/>
-          <a:lstStyle/>
-          <a:p>
-            <a:r>
-              <a:rPr kumimoji="1" lang="ja-JP" altLang="en-US" dirty="0"/>
-              <a:t>目次</a:t>
-            </a:r>
-          </a:p>
-        </p:txBody>
-      </p:sp>
-      <p:sp>
-        <p:nvSpPr>
-          <p:cNvPr id="3" name="コンテンツ プレースホルダー 2">
-            <a:extLst>
-              <a:ext uri="{FF2B5EF4-FFF2-40B4-BE49-F238E27FC236}">
-                <a16:creationId xmlns:a16="http://schemas.microsoft.com/office/drawing/2014/main" id="{DD8CEC85-478F-4FA3-8DDE-1770CA8EABC3}"/>
-              </a:ext>
-            </a:extLst>
-          </p:cNvPr>
-          <p:cNvSpPr>
-            <a:spLocks noGrp="1"/>
-          </p:cNvSpPr>
-          <p:nvPr>
-            <p:ph idx="1"/>
-          </p:nvPr>
-        </p:nvSpPr>
-        <p:spPr/>
-        <p:txBody>
-          <a:bodyPr/>
-          <a:lstStyle/>
-          <a:p>
-            <a:pPr marL="457200" indent="-457200">
-              <a:buFont typeface="Wingdings" panose="05000000000000000000" pitchFamily="2" charset="2"/>
-              <a:buChar char="u"/>
-            </a:pPr>
-            <a:r>
-              <a:rPr lang="en-US" altLang="ja-JP" b="1" dirty="0"/>
-              <a:t>Step1</a:t>
-            </a:r>
-            <a:r>
-              <a:rPr lang="ja-JP" altLang="en-US" b="1" dirty="0"/>
-              <a:t>　下準備</a:t>
-            </a:r>
-            <a:endParaRPr lang="en-US" altLang="ja-JP" b="1" dirty="0"/>
-          </a:p>
-          <a:p>
-            <a:pPr marL="457200" indent="-457200">
-              <a:buFont typeface="Wingdings" panose="05000000000000000000" pitchFamily="2" charset="2"/>
-              <a:buChar char="u"/>
-            </a:pPr>
-            <a:r>
-              <a:rPr kumimoji="1" lang="en-US" altLang="ja-JP" dirty="0">
-                <a:solidFill>
-                  <a:schemeClr val="bg2">
-                    <a:lumMod val="90000"/>
-                  </a:schemeClr>
-                </a:solidFill>
-              </a:rPr>
-              <a:t>Step2</a:t>
-            </a:r>
-            <a:r>
-              <a:rPr lang="ja-JP" altLang="en-US" dirty="0">
-                <a:solidFill>
-                  <a:schemeClr val="bg2">
-                    <a:lumMod val="90000"/>
-                  </a:schemeClr>
-                </a:solidFill>
-              </a:rPr>
-              <a:t>　便利なデバッグ機能の紹介</a:t>
-            </a:r>
-            <a:endParaRPr lang="en-US" altLang="ja-JP" dirty="0">
-              <a:solidFill>
-                <a:schemeClr val="bg2">
-                  <a:lumMod val="90000"/>
-                </a:schemeClr>
-              </a:solidFill>
-            </a:endParaRPr>
-          </a:p>
-          <a:p>
-            <a:pPr marL="457200" indent="-457200">
-              <a:buFont typeface="Wingdings" panose="05000000000000000000" pitchFamily="2" charset="2"/>
-              <a:buChar char="u"/>
-            </a:pPr>
-            <a:r>
-              <a:rPr lang="en-US" altLang="ja-JP" dirty="0">
-                <a:solidFill>
-                  <a:schemeClr val="bg2">
-                    <a:lumMod val="90000"/>
-                  </a:schemeClr>
-                </a:solidFill>
-              </a:rPr>
-              <a:t>Step3</a:t>
-            </a:r>
-            <a:r>
-              <a:rPr lang="ja-JP" altLang="en-US" dirty="0">
-                <a:solidFill>
-                  <a:schemeClr val="bg2">
-                    <a:lumMod val="90000"/>
-                  </a:schemeClr>
-                </a:solidFill>
-              </a:rPr>
-              <a:t>　便利なデバッグ機能の使い方</a:t>
-            </a:r>
-            <a:endParaRPr lang="en-US" altLang="ja-JP" dirty="0">
-              <a:solidFill>
-                <a:schemeClr val="bg2">
-                  <a:lumMod val="90000"/>
-                </a:schemeClr>
-              </a:solidFill>
-            </a:endParaRPr>
-          </a:p>
-        </p:txBody>
-      </p:sp>
-      <p:sp>
-        <p:nvSpPr>
-          <p:cNvPr id="4" name="フローチャート: 他ページ結合子 3">
-            <a:extLst>
-              <a:ext uri="{FF2B5EF4-FFF2-40B4-BE49-F238E27FC236}">
-                <a16:creationId xmlns:a16="http://schemas.microsoft.com/office/drawing/2014/main" id="{A264DAF4-3DCC-48F7-A0F2-CF87A7566E58}"/>
-              </a:ext>
-            </a:extLst>
-          </p:cNvPr>
-          <p:cNvSpPr/>
-          <p:nvPr/>
-        </p:nvSpPr>
-        <p:spPr>
-          <a:xfrm>
-            <a:off x="10402784" y="1"/>
-            <a:ext cx="951016" cy="2113808"/>
-          </a:xfrm>
-          <a:prstGeom prst="flowChartOffpageConnector">
-            <a:avLst/>
-          </a:prstGeom>
-        </p:spPr>
-        <p:style>
-          <a:lnRef idx="2">
-            <a:schemeClr val="accent1">
-              <a:shade val="50000"/>
-            </a:schemeClr>
-          </a:lnRef>
-          <a:fillRef idx="1">
-            <a:schemeClr val="accent1"/>
-          </a:fillRef>
-          <a:effectRef idx="0">
-            <a:schemeClr val="accent1"/>
-          </a:effectRef>
-          <a:fontRef idx="minor">
-            <a:schemeClr val="lt1"/>
-          </a:fontRef>
-        </p:style>
-        <p:txBody>
-          <a:bodyPr rtlCol="0" anchor="ctr"/>
-          <a:lstStyle/>
-          <a:p>
-            <a:pPr algn="ctr"/>
-            <a:endParaRPr kumimoji="1" lang="ja-JP" altLang="en-US"/>
-          </a:p>
-        </p:txBody>
-      </p:sp>
-    </p:spTree>
-    <p:extLst>
-      <p:ext uri="{BB962C8B-B14F-4D97-AF65-F5344CB8AC3E}">
-        <p14:creationId xmlns:p14="http://schemas.microsoft.com/office/powerpoint/2010/main" val="531861700"/>
-      </p:ext>
-    </p:extLst>
-  </p:cSld>
-  <p:clrMapOvr>
-    <a:masterClrMapping/>
-  </p:clrMapOvr>
-</p:sld>
-</file>
-
-<file path=ppt/slides/slide5.xml><?xml version="1.0" encoding="utf-8"?>
-<p:sld xmlns:a="http://schemas.openxmlformats.org/drawingml/2006/main" xmlns:r="http://schemas.openxmlformats.org/officeDocument/2006/relationships" xmlns:p="http://schemas.openxmlformats.org/presentationml/2006/main">
-  <p:cSld>
-    <p:spTree>
-      <p:nvGrpSpPr>
-        <p:cNvPr id="1" name=""/>
-        <p:cNvGrpSpPr/>
-        <p:nvPr/>
-      </p:nvGrpSpPr>
-      <p:grpSpPr>
-        <a:xfrm>
-          <a:off x="0" y="0"/>
-          <a:ext cx="0" cy="0"/>
-          <a:chOff x="0" y="0"/>
-          <a:chExt cx="0" cy="0"/>
-        </a:xfrm>
-      </p:grpSpPr>
-      <p:sp>
-        <p:nvSpPr>
-          <p:cNvPr id="2" name="タイトル 1">
-            <a:extLst>
-              <a:ext uri="{FF2B5EF4-FFF2-40B4-BE49-F238E27FC236}">
                 <a16:creationId xmlns:a16="http://schemas.microsoft.com/office/drawing/2014/main" id="{B40940E1-B226-4178-8AAC-C4A407E5309C}"/>
               </a:ext>
             </a:extLst>
@@ -7105,7 +6722,7 @@
 </p:sld>
 </file>
 
-<file path=ppt/slides/slide6.xml><?xml version="1.0" encoding="utf-8"?>
+<file path=ppt/slides/slide5.xml><?xml version="1.0" encoding="utf-8"?>
 <p:sld xmlns:a="http://schemas.openxmlformats.org/drawingml/2006/main" xmlns:r="http://schemas.openxmlformats.org/officeDocument/2006/relationships" xmlns:p="http://schemas.openxmlformats.org/presentationml/2006/main">
   <p:cSld>
     <p:spTree>
@@ -7751,7 +7368,7 @@
 </p:sld>
 </file>
 
-<file path=ppt/slides/slide7.xml><?xml version="1.0" encoding="utf-8"?>
+<file path=ppt/slides/slide6.xml><?xml version="1.0" encoding="utf-8"?>
 <p:sld xmlns:a="http://schemas.openxmlformats.org/drawingml/2006/main" xmlns:r="http://schemas.openxmlformats.org/officeDocument/2006/relationships" xmlns:p="http://schemas.openxmlformats.org/presentationml/2006/main">
   <p:cSld>
     <p:spTree>
@@ -8253,7 +7870,7 @@
 </p:sld>
 </file>
 
-<file path=ppt/slides/slide8.xml><?xml version="1.0" encoding="utf-8"?>
+<file path=ppt/slides/slide7.xml><?xml version="1.0" encoding="utf-8"?>
 <p:sld xmlns:a="http://schemas.openxmlformats.org/drawingml/2006/main" xmlns:r="http://schemas.openxmlformats.org/officeDocument/2006/relationships" xmlns:p="http://schemas.openxmlformats.org/presentationml/2006/main">
   <p:cSld>
     <p:spTree>
@@ -8460,6 +8077,253 @@
     <p:extLst>
       <p:ext uri="{BB962C8B-B14F-4D97-AF65-F5344CB8AC3E}">
         <p14:creationId xmlns:p14="http://schemas.microsoft.com/office/powerpoint/2010/main" val="3612418012"/>
+      </p:ext>
+    </p:extLst>
+  </p:cSld>
+  <p:clrMapOvr>
+    <a:masterClrMapping/>
+  </p:clrMapOvr>
+</p:sld>
+</file>
+
+<file path=ppt/slides/slide8.xml><?xml version="1.0" encoding="utf-8"?>
+<p:sld xmlns:a="http://schemas.openxmlformats.org/drawingml/2006/main" xmlns:r="http://schemas.openxmlformats.org/officeDocument/2006/relationships" xmlns:p="http://schemas.openxmlformats.org/presentationml/2006/main">
+  <p:cSld>
+    <p:spTree>
+      <p:nvGrpSpPr>
+        <p:cNvPr id="1" name=""/>
+        <p:cNvGrpSpPr/>
+        <p:nvPr/>
+      </p:nvGrpSpPr>
+      <p:grpSpPr>
+        <a:xfrm>
+          <a:off x="0" y="0"/>
+          <a:ext cx="0" cy="0"/>
+          <a:chOff x="0" y="0"/>
+          <a:chExt cx="0" cy="0"/>
+        </a:xfrm>
+      </p:grpSpPr>
+      <p:sp>
+        <p:nvSpPr>
+          <p:cNvPr id="2" name="タイトル 1">
+            <a:extLst>
+              <a:ext uri="{FF2B5EF4-FFF2-40B4-BE49-F238E27FC236}">
+                <a16:creationId xmlns:a16="http://schemas.microsoft.com/office/drawing/2014/main" id="{6F3C7249-01DA-4974-9471-773ADFF2918D}"/>
+              </a:ext>
+            </a:extLst>
+          </p:cNvPr>
+          <p:cNvSpPr>
+            <a:spLocks noGrp="1"/>
+          </p:cNvSpPr>
+          <p:nvPr>
+            <p:ph type="title"/>
+          </p:nvPr>
+        </p:nvSpPr>
+        <p:spPr/>
+        <p:txBody>
+          <a:bodyPr>
+            <a:normAutofit/>
+          </a:bodyPr>
+          <a:lstStyle/>
+          <a:p>
+            <a:pPr marL="571500" indent="-571500">
+              <a:buFont typeface="Wingdings" panose="05000000000000000000" pitchFamily="2" charset="2"/>
+              <a:buChar char="u"/>
+            </a:pPr>
+            <a:r>
+              <a:rPr kumimoji="1" lang="en-US" altLang="ja-JP" sz="3600" dirty="0"/>
+              <a:t>_ASSERT_EXPR_EX(expr, str, …)</a:t>
+            </a:r>
+            <a:endParaRPr kumimoji="1" lang="ja-JP" altLang="en-US" sz="3600" dirty="0"/>
+          </a:p>
+        </p:txBody>
+      </p:sp>
+      <p:sp>
+        <p:nvSpPr>
+          <p:cNvPr id="3" name="コンテンツ プレースホルダー 2">
+            <a:extLst>
+              <a:ext uri="{FF2B5EF4-FFF2-40B4-BE49-F238E27FC236}">
+                <a16:creationId xmlns:a16="http://schemas.microsoft.com/office/drawing/2014/main" id="{D2559C2F-FBCB-4B0B-B37E-C4A7260BD447}"/>
+              </a:ext>
+            </a:extLst>
+          </p:cNvPr>
+          <p:cNvSpPr>
+            <a:spLocks noGrp="1"/>
+          </p:cNvSpPr>
+          <p:nvPr>
+            <p:ph idx="1"/>
+          </p:nvPr>
+        </p:nvSpPr>
+        <p:spPr/>
+        <p:txBody>
+          <a:bodyPr>
+            <a:normAutofit lnSpcReduction="10000"/>
+          </a:bodyPr>
+          <a:lstStyle/>
+          <a:p>
+            <a:pPr marL="0" indent="0">
+              <a:lnSpc>
+                <a:spcPct val="150000"/>
+              </a:lnSpc>
+              <a:buNone/>
+            </a:pPr>
+            <a:r>
+              <a:rPr lang="en-US" altLang="ja-JP" b="1" i="1" dirty="0"/>
+              <a:t>expr</a:t>
+            </a:r>
+            <a:r>
+              <a:rPr lang="en-US" altLang="ja-JP" dirty="0"/>
+              <a:t>	</a:t>
+            </a:r>
+            <a:r>
+              <a:rPr lang="ja-JP" altLang="en-US" dirty="0"/>
+              <a:t>：真理値で、</a:t>
+            </a:r>
+            <a:r>
+              <a:rPr lang="en-US" altLang="ja-JP" dirty="0"/>
+              <a:t>true</a:t>
+            </a:r>
+            <a:r>
+              <a:rPr lang="ja-JP" altLang="en-US" dirty="0"/>
+              <a:t>もしくは</a:t>
+            </a:r>
+            <a:r>
+              <a:rPr lang="en-US" altLang="ja-JP" dirty="0"/>
+              <a:t>false</a:t>
+            </a:r>
+            <a:r>
+              <a:rPr lang="ja-JP" altLang="en-US" dirty="0"/>
+              <a:t>を表す。</a:t>
+            </a:r>
+            <a:endParaRPr lang="en-US" altLang="ja-JP" dirty="0"/>
+          </a:p>
+          <a:p>
+            <a:pPr marL="0" indent="0">
+              <a:lnSpc>
+                <a:spcPct val="150000"/>
+              </a:lnSpc>
+              <a:buNone/>
+            </a:pPr>
+            <a:r>
+              <a:rPr lang="en-US" altLang="ja-JP" b="1" i="1" dirty="0"/>
+              <a:t>s</a:t>
+            </a:r>
+            <a:r>
+              <a:rPr kumimoji="1" lang="en-US" altLang="ja-JP" b="1" i="1" dirty="0"/>
+              <a:t>tr</a:t>
+            </a:r>
+            <a:r>
+              <a:rPr kumimoji="1" lang="en-US" altLang="ja-JP" dirty="0"/>
+              <a:t>	</a:t>
+            </a:r>
+            <a:r>
+              <a:rPr kumimoji="1" lang="ja-JP" altLang="en-US" dirty="0"/>
+              <a:t>：表示させたい可変長引数文字列</a:t>
+            </a:r>
+            <a:endParaRPr kumimoji="1" lang="en-US" altLang="ja-JP" dirty="0"/>
+          </a:p>
+          <a:p>
+            <a:pPr marL="0" indent="0">
+              <a:lnSpc>
+                <a:spcPct val="150000"/>
+              </a:lnSpc>
+              <a:buNone/>
+            </a:pPr>
+            <a:r>
+              <a:rPr lang="en-US" altLang="ja-JP" b="1" i="1" dirty="0"/>
+              <a:t>…</a:t>
+            </a:r>
+            <a:r>
+              <a:rPr lang="en-US" altLang="ja-JP" dirty="0"/>
+              <a:t>	</a:t>
+            </a:r>
+            <a:r>
+              <a:rPr lang="ja-JP" altLang="en-US" dirty="0"/>
+              <a:t>：（文字列に取り入れたい）可変長引数</a:t>
+            </a:r>
+            <a:endParaRPr kumimoji="1" lang="en-US" altLang="ja-JP" dirty="0"/>
+          </a:p>
+          <a:p>
+            <a:pPr marL="0" indent="0">
+              <a:lnSpc>
+                <a:spcPct val="150000"/>
+              </a:lnSpc>
+              <a:buNone/>
+            </a:pPr>
+            <a:r>
+              <a:rPr kumimoji="1" lang="ja-JP" altLang="en-US" b="1" i="1" dirty="0"/>
+              <a:t>動作</a:t>
+            </a:r>
+            <a:r>
+              <a:rPr kumimoji="1" lang="en-US" altLang="ja-JP" dirty="0"/>
+              <a:t>	</a:t>
+            </a:r>
+            <a:r>
+              <a:rPr kumimoji="1" lang="ja-JP" altLang="en-US" dirty="0"/>
+              <a:t>：</a:t>
+            </a:r>
+            <a:r>
+              <a:rPr kumimoji="1" lang="en-US" altLang="ja-JP" b="1" i="1" dirty="0"/>
+              <a:t>expr</a:t>
+            </a:r>
+            <a:r>
+              <a:rPr kumimoji="1" lang="en-US" altLang="ja-JP" dirty="0"/>
+              <a:t> == false </a:t>
+            </a:r>
+            <a:r>
+              <a:rPr kumimoji="1" lang="ja-JP" altLang="en-US" dirty="0"/>
+              <a:t>なら、警告ウィンドウで</a:t>
+            </a:r>
+            <a:r>
+              <a:rPr kumimoji="1" lang="en-US" altLang="ja-JP" b="1" i="1" dirty="0"/>
+              <a:t>str</a:t>
+            </a:r>
+            <a:r>
+              <a:rPr kumimoji="1" lang="ja-JP" altLang="en-US" dirty="0"/>
+              <a:t>を表示し、</a:t>
+            </a:r>
+            <a:endParaRPr kumimoji="1" lang="en-US" altLang="ja-JP" dirty="0"/>
+          </a:p>
+          <a:p>
+            <a:pPr marL="0" indent="0">
+              <a:lnSpc>
+                <a:spcPct val="150000"/>
+              </a:lnSpc>
+              <a:buNone/>
+            </a:pPr>
+            <a:r>
+              <a:rPr kumimoji="1" lang="en-US" altLang="ja-JP" dirty="0"/>
+              <a:t>	</a:t>
+            </a:r>
+            <a:r>
+              <a:rPr kumimoji="1" lang="ja-JP" altLang="en-US" dirty="0"/>
+              <a:t>　プログラムを終了させる。デバッグウィンドウにも</a:t>
+            </a:r>
+            <a:endParaRPr kumimoji="1" lang="en-US" altLang="ja-JP" dirty="0"/>
+          </a:p>
+          <a:p>
+            <a:pPr marL="0" indent="0">
+              <a:lnSpc>
+                <a:spcPct val="150000"/>
+              </a:lnSpc>
+              <a:buNone/>
+            </a:pPr>
+            <a:r>
+              <a:rPr lang="en-US" altLang="ja-JP" dirty="0"/>
+              <a:t>	</a:t>
+            </a:r>
+            <a:r>
+              <a:rPr lang="ja-JP" altLang="en-US" dirty="0"/>
+              <a:t>　文字列を表示させる。</a:t>
+            </a:r>
+            <a:endParaRPr kumimoji="1" lang="en-US" altLang="ja-JP" dirty="0"/>
+          </a:p>
+        </p:txBody>
+      </p:sp>
+    </p:spTree>
+    <p:extLst>
+      <p:ext uri="{BB962C8B-B14F-4D97-AF65-F5344CB8AC3E}">
+        <p14:creationId xmlns:p14="http://schemas.microsoft.com/office/powerpoint/2010/main" val="378267976"/>
       </p:ext>
     </p:extLst>
   </p:cSld>
@@ -8514,8 +8378,12 @@
               <a:buChar char="u"/>
             </a:pPr>
             <a:r>
+              <a:rPr lang="en-US" altLang="ja-JP" sz="3600" dirty="0" err="1"/>
+              <a:t>OutputDebugStringEx</a:t>
+            </a:r>
+            <a:r>
               <a:rPr kumimoji="1" lang="en-US" altLang="ja-JP" sz="3600" dirty="0"/>
-              <a:t>_ASSERT_EXPR_EX(expr, str, …)</a:t>
+              <a:t>(str, …)</a:t>
             </a:r>
             <a:endParaRPr kumimoji="1" lang="ja-JP" altLang="en-US" sz="3600" dirty="0"/>
           </a:p>
@@ -8539,9 +8407,7 @@
         </p:nvSpPr>
         <p:spPr/>
         <p:txBody>
-          <a:bodyPr>
-            <a:normAutofit lnSpcReduction="10000"/>
-          </a:bodyPr>
+          <a:bodyPr/>
           <a:lstStyle/>
           <a:p>
             <a:pPr marL="0" indent="0">
@@ -8552,7 +8418,7 @@
             </a:pPr>
             <a:r>
               <a:rPr lang="en-US" altLang="ja-JP" b="1" i="1" dirty="0"/>
-              <a:t>expr</a:t>
+              <a:t>str</a:t>
             </a:r>
             <a:r>
               <a:rPr lang="en-US" altLang="ja-JP" dirty="0"/>
@@ -8560,23 +8426,7 @@
             </a:r>
             <a:r>
               <a:rPr lang="ja-JP" altLang="en-US" dirty="0"/>
-              <a:t>：真理値で、</a:t>
-            </a:r>
-            <a:r>
-              <a:rPr lang="en-US" altLang="ja-JP" dirty="0"/>
-              <a:t>true</a:t>
-            </a:r>
-            <a:r>
-              <a:rPr lang="ja-JP" altLang="en-US" dirty="0"/>
-              <a:t>もしくは</a:t>
-            </a:r>
-            <a:r>
-              <a:rPr lang="en-US" altLang="ja-JP" dirty="0"/>
-              <a:t>false</a:t>
-            </a:r>
-            <a:r>
-              <a:rPr lang="ja-JP" altLang="en-US" dirty="0"/>
-              <a:t>を表す。</a:t>
+              <a:t>：表示させたい可変長引数文字列</a:t>
             </a:r>
             <a:endParaRPr lang="en-US" altLang="ja-JP" dirty="0"/>
           </a:p>
@@ -8588,12 +8438,8 @@
               <a:buNone/>
             </a:pPr>
             <a:r>
-              <a:rPr lang="en-US" altLang="ja-JP" b="1" i="1" dirty="0"/>
-              <a:t>s</a:t>
-            </a:r>
-            <a:r>
               <a:rPr kumimoji="1" lang="en-US" altLang="ja-JP" b="1" i="1" dirty="0"/>
-              <a:t>tr</a:t>
+              <a:t>…</a:t>
             </a:r>
             <a:r>
               <a:rPr kumimoji="1" lang="en-US" altLang="ja-JP" dirty="0"/>
@@ -8601,7 +8447,7 @@
             </a:r>
             <a:r>
               <a:rPr kumimoji="1" lang="ja-JP" altLang="en-US" dirty="0"/>
-              <a:t>：表示させたい可変長引数文字列</a:t>
+              <a:t>：（文字列に取り入れたい）可変長引数</a:t>
             </a:r>
             <a:endParaRPr kumimoji="1" lang="en-US" altLang="ja-JP" dirty="0"/>
           </a:p>
@@ -8613,100 +8459,33 @@
               <a:buNone/>
             </a:pPr>
             <a:r>
+              <a:rPr lang="ja-JP" altLang="en-US" b="1" i="1" dirty="0"/>
+              <a:t>動作</a:t>
+            </a:r>
+            <a:r>
               <a:rPr lang="en-US" altLang="ja-JP" b="1" i="1" dirty="0"/>
-              <a:t>…</a:t>
-            </a:r>
-            <a:r>
-              <a:rPr lang="en-US" altLang="ja-JP" dirty="0"/>
               <a:t>	</a:t>
             </a:r>
             <a:r>
               <a:rPr lang="ja-JP" altLang="en-US" dirty="0"/>
-              <a:t>：（文字列に取り入れたい）可変長引数</a:t>
-            </a:r>
-            <a:endParaRPr kumimoji="1" lang="en-US" altLang="ja-JP" dirty="0"/>
-          </a:p>
-          <a:p>
-            <a:pPr marL="0" indent="0">
-              <a:lnSpc>
-                <a:spcPct val="150000"/>
-              </a:lnSpc>
-              <a:buNone/>
-            </a:pPr>
-            <a:r>
-              <a:rPr kumimoji="1" lang="ja-JP" altLang="en-US" b="1" i="1" dirty="0"/>
-              <a:t>動作</a:t>
-            </a:r>
-            <a:r>
-              <a:rPr kumimoji="1" lang="en-US" altLang="ja-JP" dirty="0"/>
-              <a:t>	</a:t>
-            </a:r>
-            <a:r>
-              <a:rPr kumimoji="1" lang="ja-JP" altLang="en-US" dirty="0"/>
               <a:t>：</a:t>
             </a:r>
             <a:r>
-              <a:rPr kumimoji="1" lang="en-US" altLang="ja-JP" b="1" i="1" dirty="0"/>
-              <a:t>expr</a:t>
-            </a:r>
-            <a:r>
-              <a:rPr kumimoji="1" lang="en-US" altLang="ja-JP" dirty="0"/>
-              <a:t> == false </a:t>
-            </a:r>
-            <a:r>
-              <a:rPr kumimoji="1" lang="ja-JP" altLang="en-US" dirty="0"/>
-              <a:t>なら、警告ウィンドウで</a:t>
-            </a:r>
-            <a:r>
-              <a:rPr kumimoji="1" lang="en-US" altLang="ja-JP" b="1" i="1" dirty="0"/>
+              <a:rPr lang="en-US" altLang="ja-JP" b="1" i="1" dirty="0"/>
               <a:t>str</a:t>
             </a:r>
             <a:r>
-              <a:rPr kumimoji="1" lang="ja-JP" altLang="en-US" dirty="0"/>
-              <a:t>を表示し、</a:t>
-            </a:r>
-            <a:endParaRPr kumimoji="1" lang="en-US" altLang="ja-JP" dirty="0"/>
-          </a:p>
-          <a:p>
-            <a:pPr marL="0" indent="0">
-              <a:lnSpc>
-                <a:spcPct val="150000"/>
-              </a:lnSpc>
-              <a:buNone/>
-            </a:pPr>
-            <a:r>
-              <a:rPr kumimoji="1" lang="en-US" altLang="ja-JP" dirty="0"/>
-              <a:t>	</a:t>
-            </a:r>
-            <a:r>
-              <a:rPr kumimoji="1" lang="ja-JP" altLang="en-US" dirty="0"/>
-              <a:t>　プログラムを終了させる。デバッグウィンドウにも</a:t>
-            </a:r>
-            <a:endParaRPr kumimoji="1" lang="en-US" altLang="ja-JP" dirty="0"/>
-          </a:p>
-          <a:p>
-            <a:pPr marL="0" indent="0">
-              <a:lnSpc>
-                <a:spcPct val="150000"/>
-              </a:lnSpc>
-              <a:buNone/>
-            </a:pPr>
-            <a:r>
-              <a:rPr lang="en-US" altLang="ja-JP" dirty="0"/>
-              <a:t>	</a:t>
-            </a:r>
-            <a:r>
               <a:rPr lang="ja-JP" altLang="en-US" dirty="0"/>
-              <a:t>　文字列を表示させる。</a:t>
-            </a:r>
-            <a:endParaRPr kumimoji="1" lang="en-US" altLang="ja-JP" dirty="0"/>
+              <a:t>をデバッグウィンドウに表示させる。</a:t>
+            </a:r>
+            <a:endParaRPr kumimoji="1" lang="en-US" altLang="ja-JP" b="1" i="1" dirty="0"/>
           </a:p>
         </p:txBody>
       </p:sp>
     </p:spTree>
     <p:extLst>
       <p:ext uri="{BB962C8B-B14F-4D97-AF65-F5344CB8AC3E}">
-        <p14:creationId xmlns:p14="http://schemas.microsoft.com/office/powerpoint/2010/main" val="378267976"/>
+        <p14:creationId xmlns:p14="http://schemas.microsoft.com/office/powerpoint/2010/main" val="3319339585"/>
       </p:ext>
     </p:extLst>
   </p:cSld>

</xml_diff>